<commit_message>
modified:   zEn +/Buy your space place.pptx
</commit_message>
<xml_diff>
--- a/zEn +/Buy your space place.pptx
+++ b/zEn +/Buy your space place.pptx
@@ -6553,7 +6553,7 @@
                 <a:effectLst/>
                 <a:latin typeface="Nova Square"/>
               </a:rPr>
-              <a:t>fait partie, il vend planètes découvertes durant l’ère préhistorique</a:t>
+              <a:t>fait partie, il vend des planètes découvertes durant l’ère préhistorique</a:t>
             </a:r>
             <a:endParaRPr lang="fr-FR" b="1" i="0" dirty="0">
               <a:solidFill>
@@ -6955,7 +6955,7 @@
               <a:rPr lang="fr-FR" b="1" dirty="0">
                 <a:latin typeface="Nova Square"/>
               </a:rPr>
-              <a:t>Je n’ai donc pas réellement fait de maquette, je suis partie du postulat de départ, « Un site des zone a cliqué, on arrive sur une page de vente, qui mène ensuite à l’achat » :</a:t>
+              <a:t>Je n’ai donc pas réellement fait de maquette, je suis partie du postulat de départ, « Un site, des zones à cliquer, on arrive sur une page de vente, qui mène ensuite à l’achat » :</a:t>
             </a:r>
           </a:p>
           <a:p>
@@ -6966,7 +6966,7 @@
               <a:rPr lang="fr-FR" b="1" dirty="0">
                 <a:latin typeface="Nova Square"/>
               </a:rPr>
-              <a:t>Mon site est donc découpé en 3 grandes Page :</a:t>
+              <a:t>Mon site est donc découpé en 3 grandes Pages :</a:t>
             </a:r>
           </a:p>
           <a:p>

</xml_diff>

<commit_message>
Changes to be committed: 	modified:   page_acceuil/E5.css 	modified:   page_acceuil/E5.html 	new file:   page_achat/Gliese832_c/gliese832.html  new file:   page_achat/Gliese832_c/image/Alien.jpg 	new file:   page_achat/Gliese832_c/image/Grus_IAU.svg.png 	modified:   page_achat/Kepler/Kepler22b.html 	modified:   page_achat/Trappist1D/Trappist1D.html 	modified:   page_achat/buy.css 	modified:   page_legal/legal.css 	modified:   zEn +/Buy your space place.pptx 	modified:   zEn +/f.html
</commit_message>
<xml_diff>
--- a/zEn +/Buy your space place.pptx
+++ b/zEn +/Buy your space place.pptx
@@ -14,6 +14,7 @@
     <p:sldId id="264" r:id="rId8"/>
     <p:sldId id="265" r:id="rId9"/>
     <p:sldId id="266" r:id="rId10"/>
+    <p:sldId id="267" r:id="rId11"/>
   </p:sldIdLst>
   <p:sldSz cx="12192000" cy="6858000"/>
   <p:notesSz cx="6858000" cy="9144000"/>
@@ -6203,6 +6204,146 @@
 </p:sld>
 </file>
 
+<file path=ppt/slides/slide10.xml><?xml version="1.0" encoding="utf-8"?>
+<p:sld xmlns:a="http://schemas.openxmlformats.org/drawingml/2006/main" xmlns:r="http://schemas.openxmlformats.org/officeDocument/2006/relationships" xmlns:p="http://schemas.openxmlformats.org/presentationml/2006/main">
+  <p:cSld>
+    <p:spTree>
+      <p:nvGrpSpPr>
+        <p:cNvPr id="1" name=""/>
+        <p:cNvGrpSpPr/>
+        <p:nvPr/>
+      </p:nvGrpSpPr>
+      <p:grpSpPr>
+        <a:xfrm>
+          <a:off x="0" y="0"/>
+          <a:ext cx="0" cy="0"/>
+          <a:chOff x="0" y="0"/>
+          <a:chExt cx="0" cy="0"/>
+        </a:xfrm>
+      </p:grpSpPr>
+      <p:sp>
+        <p:nvSpPr>
+          <p:cNvPr id="2" name="Titre 1">
+            <a:extLst>
+              <a:ext uri="{FF2B5EF4-FFF2-40B4-BE49-F238E27FC236}">
+                <a16:creationId xmlns:a16="http://schemas.microsoft.com/office/drawing/2014/main" id="{FF33666F-F1D9-0B51-D191-243054B0D9CB}"/>
+              </a:ext>
+            </a:extLst>
+          </p:cNvPr>
+          <p:cNvSpPr>
+            <a:spLocks noGrp="1"/>
+          </p:cNvSpPr>
+          <p:nvPr>
+            <p:ph type="title"/>
+          </p:nvPr>
+        </p:nvSpPr>
+        <p:spPr>
+          <a:xfrm>
+            <a:off x="960683" y="1862446"/>
+            <a:ext cx="10353762" cy="970450"/>
+          </a:xfrm>
+        </p:spPr>
+        <p:txBody>
+          <a:bodyPr>
+            <a:normAutofit/>
+          </a:bodyPr>
+          <a:lstStyle/>
+          <a:p>
+            <a:r>
+              <a:rPr lang="fr-FR" b="1" dirty="0">
+                <a:latin typeface="Nova Square"/>
+              </a:rPr>
+              <a:t>Merci de m’avoir écouté</a:t>
+            </a:r>
+            <a:endParaRPr lang="fr-FR" dirty="0"/>
+          </a:p>
+        </p:txBody>
+      </p:sp>
+      <p:pic>
+        <p:nvPicPr>
+          <p:cNvPr id="4" name="Image 3">
+            <a:extLst>
+              <a:ext uri="{FF2B5EF4-FFF2-40B4-BE49-F238E27FC236}">
+                <a16:creationId xmlns:a16="http://schemas.microsoft.com/office/drawing/2014/main" id="{F197C43A-6896-85D9-4845-608992C0A826}"/>
+              </a:ext>
+            </a:extLst>
+          </p:cNvPr>
+          <p:cNvPicPr>
+            <a:picLocks noChangeAspect="1"/>
+          </p:cNvPicPr>
+          <p:nvPr/>
+        </p:nvPicPr>
+        <p:blipFill>
+          <a:blip r:embed="rId2">
+            <a:extLst>
+              <a:ext uri="{28A0092B-C50C-407E-A947-70E740481C1C}">
+                <a14:useLocalDpi xmlns:a14="http://schemas.microsoft.com/office/drawing/2010/main" val="0"/>
+              </a:ext>
+            </a:extLst>
+          </a:blip>
+          <a:stretch>
+            <a:fillRect/>
+          </a:stretch>
+        </p:blipFill>
+        <p:spPr>
+          <a:xfrm>
+            <a:off x="10984675" y="0"/>
+            <a:ext cx="1207325" cy="1266424"/>
+          </a:xfrm>
+          <a:prstGeom prst="rect">
+            <a:avLst/>
+          </a:prstGeom>
+        </p:spPr>
+      </p:pic>
+      <p:pic>
+        <p:nvPicPr>
+          <p:cNvPr id="5" name="Image 4">
+            <a:extLst>
+              <a:ext uri="{FF2B5EF4-FFF2-40B4-BE49-F238E27FC236}">
+                <a16:creationId xmlns:a16="http://schemas.microsoft.com/office/drawing/2014/main" id="{819D9CE3-E1F3-8B49-1C8C-AF1B6C234C74}"/>
+              </a:ext>
+            </a:extLst>
+          </p:cNvPr>
+          <p:cNvPicPr>
+            <a:picLocks noChangeAspect="1"/>
+          </p:cNvPicPr>
+          <p:nvPr/>
+        </p:nvPicPr>
+        <p:blipFill>
+          <a:blip r:embed="rId2">
+            <a:extLst>
+              <a:ext uri="{28A0092B-C50C-407E-A947-70E740481C1C}">
+                <a14:useLocalDpi xmlns:a14="http://schemas.microsoft.com/office/drawing/2010/main" val="0"/>
+              </a:ext>
+            </a:extLst>
+          </a:blip>
+          <a:stretch>
+            <a:fillRect/>
+          </a:stretch>
+        </p:blipFill>
+        <p:spPr>
+          <a:xfrm>
+            <a:off x="4607052" y="2602271"/>
+            <a:ext cx="2977895" cy="3123664"/>
+          </a:xfrm>
+          <a:prstGeom prst="rect">
+            <a:avLst/>
+          </a:prstGeom>
+        </p:spPr>
+      </p:pic>
+    </p:spTree>
+    <p:extLst>
+      <p:ext uri="{BB962C8B-B14F-4D97-AF65-F5344CB8AC3E}">
+        <p14:creationId xmlns:p14="http://schemas.microsoft.com/office/powerpoint/2010/main" val="2901705603"/>
+      </p:ext>
+    </p:extLst>
+  </p:cSld>
+  <p:clrMapOvr>
+    <a:masterClrMapping/>
+  </p:clrMapOvr>
+</p:sld>
+</file>
+
 <file path=ppt/slides/slide2.xml><?xml version="1.0" encoding="utf-8"?>
 <p:sld xmlns:a="http://schemas.openxmlformats.org/drawingml/2006/main" xmlns:r="http://schemas.openxmlformats.org/officeDocument/2006/relationships" xmlns:p="http://schemas.openxmlformats.org/presentationml/2006/main">
   <p:cSld>
@@ -6270,7 +6411,12 @@
             <p:ph idx="1"/>
           </p:nvPr>
         </p:nvSpPr>
-        <p:spPr/>
+        <p:spPr>
+          <a:xfrm>
+            <a:off x="913795" y="1580051"/>
+            <a:ext cx="10353762" cy="4211150"/>
+          </a:xfrm>
+        </p:spPr>
         <p:txBody>
           <a:bodyPr/>
           <a:lstStyle/>
@@ -6945,7 +7091,9 @@
           </a:xfrm>
         </p:spPr>
         <p:txBody>
-          <a:bodyPr/>
+          <a:bodyPr>
+            <a:normAutofit lnSpcReduction="10000"/>
+          </a:bodyPr>
           <a:lstStyle/>
           <a:p>
             <a:pPr marL="36900" indent="0">
@@ -6966,7 +7114,7 @@
               <a:rPr lang="fr-FR" b="1" dirty="0">
                 <a:latin typeface="Nova Square"/>
               </a:rPr>
-              <a:t>Mon site est donc découpé en 3 grandes Pages :</a:t>
+              <a:t>Mon site est donc découpé en 3 page :</a:t>
             </a:r>
           </a:p>
           <a:p>
@@ -7029,6 +7177,17 @@
                 <a:latin typeface="Nova Square"/>
               </a:rPr>
               <a:t>	|_Trappist1D</a:t>
+            </a:r>
+          </a:p>
+          <a:p>
+            <a:pPr marL="36900" indent="0">
+              <a:buNone/>
+            </a:pPr>
+            <a:r>
+              <a:rPr lang="fr-FR" b="1" dirty="0">
+                <a:latin typeface="Nova Square"/>
+              </a:rPr>
+              <a:t>	|_ …</a:t>
             </a:r>
           </a:p>
           <a:p>
@@ -7165,7 +7324,7 @@
               <a:rPr lang="fr-FR" b="1" dirty="0">
                 <a:latin typeface="Nova Square"/>
               </a:rPr>
-              <a:t>La Maquette La Maquette / Conception</a:t>
+              <a:t>La Maquette / Conception</a:t>
             </a:r>
             <a:endParaRPr lang="fr-FR" dirty="0"/>
           </a:p>
@@ -7434,7 +7593,7 @@
               <a:rPr lang="fr-FR" b="1" dirty="0">
                 <a:latin typeface="Nova Square"/>
               </a:rPr>
-              <a:t>La Maquette La Maquette / Conception</a:t>
+              <a:t>La Maquette  / Conception</a:t>
             </a:r>
             <a:endParaRPr lang="fr-FR" dirty="0"/>
           </a:p>
@@ -7611,7 +7770,7 @@
               <a:rPr lang="fr-FR" b="1" dirty="0">
                 <a:latin typeface="Nova Square"/>
               </a:rPr>
-              <a:t>La Maquette La Maquette / Conception</a:t>
+              <a:t>La Maquette/ Conception</a:t>
             </a:r>
             <a:endParaRPr lang="fr-FR" dirty="0"/>
           </a:p>
@@ -7904,13 +8063,32 @@
         </p:nvSpPr>
         <p:spPr>
           <a:xfrm>
-            <a:off x="494126" y="1833390"/>
+            <a:off x="494126" y="1489005"/>
             <a:ext cx="11193099" cy="4058751"/>
           </a:xfrm>
         </p:spPr>
         <p:txBody>
           <a:bodyPr/>
           <a:lstStyle/>
+          <a:p>
+            <a:pPr marL="36900" indent="0" algn="ctr">
+              <a:buNone/>
+            </a:pPr>
+            <a:r>
+              <a:rPr lang="fr-FR" b="1" dirty="0">
+                <a:latin typeface="Nova Square"/>
+              </a:rPr>
+              <a:t>Pour la suite de la présentation.</a:t>
+            </a:r>
+          </a:p>
+          <a:p>
+            <a:pPr marL="36900" indent="0" algn="ctr">
+              <a:buNone/>
+            </a:pPr>
+            <a:endParaRPr lang="fr-FR" b="1" dirty="0">
+              <a:latin typeface="Nova Square"/>
+            </a:endParaRPr>
+          </a:p>
           <a:p>
             <a:pPr marL="36900" indent="0" algn="ctr">
               <a:buNone/>

</xml_diff>